<commit_message>
modified script and presentation
</commit_message>
<xml_diff>
--- a/presentation/ControllingTheWorldBouvetOne.pptx
+++ b/presentation/ControllingTheWorldBouvetOne.pptx
@@ -15,12 +15,12 @@
     <p:sldId id="286" r:id="rId6"/>
     <p:sldId id="287" r:id="rId7"/>
     <p:sldId id="288" r:id="rId8"/>
-    <p:sldId id="296" r:id="rId9"/>
-    <p:sldId id="289" r:id="rId10"/>
-    <p:sldId id="291" r:id="rId11"/>
-    <p:sldId id="292" r:id="rId12"/>
-    <p:sldId id="294" r:id="rId13"/>
-    <p:sldId id="295" r:id="rId14"/>
+    <p:sldId id="289" r:id="rId9"/>
+    <p:sldId id="291" r:id="rId10"/>
+    <p:sldId id="292" r:id="rId11"/>
+    <p:sldId id="294" r:id="rId12"/>
+    <p:sldId id="295" r:id="rId13"/>
+    <p:sldId id="296" r:id="rId14"/>
     <p:sldId id="278" r:id="rId15"/>
   </p:sldIdLst>
   <p:sldSz cx="9144000" cy="6858000" type="screen4x3"/>
@@ -221,7 +221,7 @@
           <a:p>
             <a:fld id="{722E25F1-470E-45F2-BDE8-F9770272E8C0}" type="datetimeFigureOut">
               <a:rPr lang="nb-NO" smtClean="0"/>
-              <a:t>15.03.2014</a:t>
+              <a:t>16.03.2014</a:t>
             </a:fld>
             <a:endParaRPr lang="nb-NO"/>
           </a:p>
@@ -1034,7 +1034,7 @@
             <a:fld id="{D6F9BB88-8EBF-42C0-9F76-F5338070E415}" type="datetimeFigureOut">
               <a:rPr lang="nb-NO" smtClean="0"/>
               <a:pPr/>
-              <a:t>15.03.2014</a:t>
+              <a:t>16.03.2014</a:t>
             </a:fld>
             <a:endParaRPr lang="nb-NO"/>
           </a:p>
@@ -1201,7 +1201,7 @@
             <a:fld id="{D6F9BB88-8EBF-42C0-9F76-F5338070E415}" type="datetimeFigureOut">
               <a:rPr lang="nb-NO" smtClean="0"/>
               <a:pPr/>
-              <a:t>15.03.2014</a:t>
+              <a:t>16.03.2014</a:t>
             </a:fld>
             <a:endParaRPr lang="nb-NO"/>
           </a:p>
@@ -1378,7 +1378,7 @@
             <a:fld id="{D6F9BB88-8EBF-42C0-9F76-F5338070E415}" type="datetimeFigureOut">
               <a:rPr lang="nb-NO" smtClean="0"/>
               <a:pPr/>
-              <a:t>15.03.2014</a:t>
+              <a:t>16.03.2014</a:t>
             </a:fld>
             <a:endParaRPr lang="nb-NO"/>
           </a:p>
@@ -1545,7 +1545,7 @@
             <a:fld id="{D6F9BB88-8EBF-42C0-9F76-F5338070E415}" type="datetimeFigureOut">
               <a:rPr lang="nb-NO" smtClean="0"/>
               <a:pPr/>
-              <a:t>15.03.2014</a:t>
+              <a:t>16.03.2014</a:t>
             </a:fld>
             <a:endParaRPr lang="nb-NO"/>
           </a:p>
@@ -1788,7 +1788,7 @@
             <a:fld id="{D6F9BB88-8EBF-42C0-9F76-F5338070E415}" type="datetimeFigureOut">
               <a:rPr lang="nb-NO" smtClean="0"/>
               <a:pPr/>
-              <a:t>15.03.2014</a:t>
+              <a:t>16.03.2014</a:t>
             </a:fld>
             <a:endParaRPr lang="nb-NO"/>
           </a:p>
@@ -2073,7 +2073,7 @@
             <a:fld id="{D6F9BB88-8EBF-42C0-9F76-F5338070E415}" type="datetimeFigureOut">
               <a:rPr lang="nb-NO" smtClean="0"/>
               <a:pPr/>
-              <a:t>15.03.2014</a:t>
+              <a:t>16.03.2014</a:t>
             </a:fld>
             <a:endParaRPr lang="nb-NO"/>
           </a:p>
@@ -2492,7 +2492,7 @@
             <a:fld id="{D6F9BB88-8EBF-42C0-9F76-F5338070E415}" type="datetimeFigureOut">
               <a:rPr lang="nb-NO" smtClean="0"/>
               <a:pPr/>
-              <a:t>15.03.2014</a:t>
+              <a:t>16.03.2014</a:t>
             </a:fld>
             <a:endParaRPr lang="nb-NO"/>
           </a:p>
@@ -2607,7 +2607,7 @@
             <a:fld id="{D6F9BB88-8EBF-42C0-9F76-F5338070E415}" type="datetimeFigureOut">
               <a:rPr lang="nb-NO" smtClean="0"/>
               <a:pPr/>
-              <a:t>15.03.2014</a:t>
+              <a:t>16.03.2014</a:t>
             </a:fld>
             <a:endParaRPr lang="nb-NO"/>
           </a:p>
@@ -2699,7 +2699,7 @@
             <a:fld id="{D6F9BB88-8EBF-42C0-9F76-F5338070E415}" type="datetimeFigureOut">
               <a:rPr lang="nb-NO" smtClean="0"/>
               <a:pPr/>
-              <a:t>15.03.2014</a:t>
+              <a:t>16.03.2014</a:t>
             </a:fld>
             <a:endParaRPr lang="nb-NO"/>
           </a:p>
@@ -2973,7 +2973,7 @@
             <a:fld id="{D6F9BB88-8EBF-42C0-9F76-F5338070E415}" type="datetimeFigureOut">
               <a:rPr lang="nb-NO" smtClean="0"/>
               <a:pPr/>
-              <a:t>15.03.2014</a:t>
+              <a:t>16.03.2014</a:t>
             </a:fld>
             <a:endParaRPr lang="nb-NO"/>
           </a:p>
@@ -3223,7 +3223,7 @@
             <a:fld id="{D6F9BB88-8EBF-42C0-9F76-F5338070E415}" type="datetimeFigureOut">
               <a:rPr lang="nb-NO" smtClean="0"/>
               <a:pPr/>
-              <a:t>15.03.2014</a:t>
+              <a:t>16.03.2014</a:t>
             </a:fld>
             <a:endParaRPr lang="nb-NO"/>
           </a:p>
@@ -3439,7 +3439,7 @@
             <a:fld id="{D6F9BB88-8EBF-42C0-9F76-F5338070E415}" type="datetimeFigureOut">
               <a:rPr lang="nb-NO" smtClean="0"/>
               <a:pPr/>
-              <a:t>15.03.2014</a:t>
+              <a:t>16.03.2014</a:t>
             </a:fld>
             <a:endParaRPr lang="nb-NO"/>
           </a:p>
@@ -4044,75 +4044,6 @@
     <p:bg>
       <p:bgPr>
         <a:solidFill>
-          <a:schemeClr val="bg1"/>
-        </a:solidFill>
-        <a:effectLst/>
-      </p:bgPr>
-    </p:bg>
-    <p:spTree>
-      <p:nvGrpSpPr>
-        <p:cNvPr id="1" name=""/>
-        <p:cNvGrpSpPr/>
-        <p:nvPr/>
-      </p:nvGrpSpPr>
-      <p:grpSpPr>
-        <a:xfrm>
-          <a:off x="0" y="0"/>
-          <a:ext cx="0" cy="0"/>
-          <a:chOff x="0" y="0"/>
-          <a:chExt cx="0" cy="0"/>
-        </a:xfrm>
-      </p:grpSpPr>
-      <p:pic>
-        <p:nvPicPr>
-          <p:cNvPr id="6" name="Picture 5"/>
-          <p:cNvPicPr>
-            <a:picLocks noChangeAspect="1"/>
-          </p:cNvPicPr>
-          <p:nvPr/>
-        </p:nvPicPr>
-        <p:blipFill>
-          <a:blip r:embed="rId2"/>
-          <a:stretch>
-            <a:fillRect/>
-          </a:stretch>
-        </p:blipFill>
-        <p:spPr>
-          <a:xfrm>
-            <a:off x="179512" y="332656"/>
-            <a:ext cx="8648306" cy="6203405"/>
-          </a:xfrm>
-          <a:prstGeom prst="rect">
-            <a:avLst/>
-          </a:prstGeom>
-        </p:spPr>
-      </p:pic>
-    </p:spTree>
-    <p:extLst>
-      <p:ext uri="{BB962C8B-B14F-4D97-AF65-F5344CB8AC3E}">
-        <p14:creationId xmlns:p14="http://schemas.microsoft.com/office/powerpoint/2010/main" val="2388382412"/>
-      </p:ext>
-    </p:extLst>
-  </p:cSld>
-  <p:clrMapOvr>
-    <a:masterClrMapping/>
-  </p:clrMapOvr>
-  <p:timing>
-    <p:tnLst>
-      <p:par>
-        <p:cTn id="1" dur="indefinite" restart="never" nodeType="tmRoot"/>
-      </p:par>
-    </p:tnLst>
-  </p:timing>
-</p:sld>
-</file>
-
-<file path=ppt/slides/slide11.xml><?xml version="1.0" encoding="utf-8"?>
-<p:sld xmlns:a="http://schemas.openxmlformats.org/drawingml/2006/main" xmlns:r="http://schemas.openxmlformats.org/officeDocument/2006/relationships" xmlns:p="http://schemas.openxmlformats.org/presentationml/2006/main">
-  <p:cSld>
-    <p:bg>
-      <p:bgPr>
-        <a:solidFill>
           <a:schemeClr val="tx1"/>
         </a:solidFill>
         <a:effectLst/>
@@ -4199,7 +4130,7 @@
 </p:sld>
 </file>
 
-<file path=ppt/slides/slide12.xml><?xml version="1.0" encoding="utf-8"?>
+<file path=ppt/slides/slide11.xml><?xml version="1.0" encoding="utf-8"?>
 <p:sld xmlns:a="http://schemas.openxmlformats.org/drawingml/2006/main" xmlns:r="http://schemas.openxmlformats.org/officeDocument/2006/relationships" xmlns:p="http://schemas.openxmlformats.org/presentationml/2006/main">
   <p:cSld>
     <p:bg>
@@ -4250,7 +4181,7 @@
 </p:sld>
 </file>
 
-<file path=ppt/slides/slide13.xml><?xml version="1.0" encoding="utf-8"?>
+<file path=ppt/slides/slide12.xml><?xml version="1.0" encoding="utf-8"?>
 <p:sld xmlns:a="http://schemas.openxmlformats.org/drawingml/2006/main" xmlns:r="http://schemas.openxmlformats.org/officeDocument/2006/relationships" xmlns:p="http://schemas.openxmlformats.org/presentationml/2006/main">
   <p:cSld>
     <p:bg>
@@ -4500,31 +4431,7 @@
                 <a:latin typeface="Courier New" panose="02070309020205020404" pitchFamily="49" charset="0"/>
                 <a:cs typeface="Courier New" panose="02070309020205020404" pitchFamily="49" charset="0"/>
               </a:rPr>
-              <a:t>Anbefaler Simen Sommerfeldt </a:t>
-            </a:r>
-            <a:r>
-              <a:rPr lang="nb-NO" sz="3600" dirty="0" smtClean="0">
-                <a:solidFill>
-                  <a:schemeClr val="bg1">
-                    <a:lumMod val="95000"/>
-                  </a:schemeClr>
-                </a:solidFill>
-                <a:latin typeface="Courier New" panose="02070309020205020404" pitchFamily="49" charset="0"/>
-                <a:cs typeface="Courier New" panose="02070309020205020404" pitchFamily="49" charset="0"/>
-              </a:rPr>
-              <a:t>sine artikler </a:t>
-            </a:r>
-            <a:r>
-              <a:rPr lang="nb-NO" sz="3600" dirty="0">
-                <a:solidFill>
-                  <a:schemeClr val="bg1">
-                    <a:lumMod val="95000"/>
-                  </a:schemeClr>
-                </a:solidFill>
-                <a:latin typeface="Courier New" panose="02070309020205020404" pitchFamily="49" charset="0"/>
-                <a:cs typeface="Courier New" panose="02070309020205020404" pitchFamily="49" charset="0"/>
-              </a:rPr>
-              <a:t>på utbrudd</a:t>
+              <a:t>Anbefaler Simen Sommerfeldt sin artikkel på utbrudd</a:t>
             </a:r>
           </a:p>
         </p:txBody>
@@ -4546,6 +4453,82 @@
       </p:par>
     </p:tnLst>
   </p:timing>
+</p:sld>
+</file>
+
+<file path=ppt/slides/slide13.xml><?xml version="1.0" encoding="utf-8"?>
+<p:sld xmlns:a="http://schemas.openxmlformats.org/drawingml/2006/main" xmlns:r="http://schemas.openxmlformats.org/officeDocument/2006/relationships" xmlns:p="http://schemas.openxmlformats.org/presentationml/2006/main">
+  <p:cSld>
+    <p:bg>
+      <p:bgPr>
+        <a:blipFill dpi="0" rotWithShape="1">
+          <a:blip r:embed="rId2">
+            <a:lum/>
+          </a:blip>
+          <a:srcRect/>
+          <a:stretch>
+            <a:fillRect t="-2000" b="-4000"/>
+          </a:stretch>
+        </a:blipFill>
+        <a:effectLst/>
+      </p:bgPr>
+    </p:bg>
+    <p:spTree>
+      <p:nvGrpSpPr>
+        <p:cNvPr id="1" name=""/>
+        <p:cNvGrpSpPr/>
+        <p:nvPr/>
+      </p:nvGrpSpPr>
+      <p:grpSpPr>
+        <a:xfrm>
+          <a:off x="0" y="0"/>
+          <a:ext cx="0" cy="0"/>
+          <a:chOff x="0" y="0"/>
+          <a:chExt cx="0" cy="0"/>
+        </a:xfrm>
+      </p:grpSpPr>
+      <p:sp>
+        <p:nvSpPr>
+          <p:cNvPr id="4" name="TextBox 3"/>
+          <p:cNvSpPr txBox="1"/>
+          <p:nvPr/>
+        </p:nvSpPr>
+        <p:spPr>
+          <a:xfrm>
+            <a:off x="4003261" y="6486340"/>
+            <a:ext cx="5147563" cy="369332"/>
+          </a:xfrm>
+          <a:prstGeom prst="rect">
+            <a:avLst/>
+          </a:prstGeom>
+          <a:noFill/>
+        </p:spPr>
+        <p:txBody>
+          <a:bodyPr wrap="none" rtlCol="0">
+            <a:spAutoFit/>
+          </a:bodyPr>
+          <a:lstStyle/>
+          <a:p>
+            <a:r>
+              <a:rPr lang="nb-NO" b="1" dirty="0">
+                <a:latin typeface="Courier New" panose="02070309020205020404" pitchFamily="49" charset="0"/>
+                <a:cs typeface="Courier New" panose="02070309020205020404" pitchFamily="49" charset="0"/>
+              </a:rPr>
+              <a:t>https://github.com/magnushg/automatr</a:t>
+            </a:r>
+          </a:p>
+        </p:txBody>
+      </p:sp>
+    </p:spTree>
+    <p:extLst>
+      <p:ext uri="{BB962C8B-B14F-4D97-AF65-F5344CB8AC3E}">
+        <p14:creationId xmlns:p14="http://schemas.microsoft.com/office/powerpoint/2010/main" val="1381144338"/>
+      </p:ext>
+    </p:extLst>
+  </p:cSld>
+  <p:clrMapOvr>
+    <a:masterClrMapping/>
+  </p:clrMapOvr>
 </p:sld>
 </file>
 
@@ -6634,50 +6617,6 @@
   <p:cSld>
     <p:bg>
       <p:bgPr>
-        <a:blipFill dpi="0" rotWithShape="1">
-          <a:blip r:embed="rId2">
-            <a:lum/>
-          </a:blip>
-          <a:srcRect/>
-          <a:stretch>
-            <a:fillRect l="-6000" r="-6000"/>
-          </a:stretch>
-        </a:blipFill>
-        <a:effectLst/>
-      </p:bgPr>
-    </p:bg>
-    <p:spTree>
-      <p:nvGrpSpPr>
-        <p:cNvPr id="1" name=""/>
-        <p:cNvGrpSpPr/>
-        <p:nvPr/>
-      </p:nvGrpSpPr>
-      <p:grpSpPr>
-        <a:xfrm>
-          <a:off x="0" y="0"/>
-          <a:ext cx="0" cy="0"/>
-          <a:chOff x="0" y="0"/>
-          <a:chExt cx="0" cy="0"/>
-        </a:xfrm>
-      </p:grpSpPr>
-    </p:spTree>
-    <p:extLst>
-      <p:ext uri="{BB962C8B-B14F-4D97-AF65-F5344CB8AC3E}">
-        <p14:creationId xmlns:p14="http://schemas.microsoft.com/office/powerpoint/2010/main" val="2706676080"/>
-      </p:ext>
-    </p:extLst>
-  </p:cSld>
-  <p:clrMapOvr>
-    <a:masterClrMapping/>
-  </p:clrMapOvr>
-</p:sld>
-</file>
-
-<file path=ppt/slides/slide9.xml><?xml version="1.0" encoding="utf-8"?>
-<p:sld xmlns:a="http://schemas.openxmlformats.org/drawingml/2006/main" xmlns:r="http://schemas.openxmlformats.org/officeDocument/2006/relationships" xmlns:p="http://schemas.openxmlformats.org/presentationml/2006/main">
-  <p:cSld>
-    <p:bg>
-      <p:bgPr>
         <a:solidFill>
           <a:schemeClr val="tx1"/>
         </a:solidFill>
@@ -6769,6 +6708,75 @@
     <p:extLst>
       <p:ext uri="{BB962C8B-B14F-4D97-AF65-F5344CB8AC3E}">
         <p14:creationId xmlns:p14="http://schemas.microsoft.com/office/powerpoint/2010/main" val="1607200663"/>
+      </p:ext>
+    </p:extLst>
+  </p:cSld>
+  <p:clrMapOvr>
+    <a:masterClrMapping/>
+  </p:clrMapOvr>
+  <p:timing>
+    <p:tnLst>
+      <p:par>
+        <p:cTn id="1" dur="indefinite" restart="never" nodeType="tmRoot"/>
+      </p:par>
+    </p:tnLst>
+  </p:timing>
+</p:sld>
+</file>
+
+<file path=ppt/slides/slide9.xml><?xml version="1.0" encoding="utf-8"?>
+<p:sld xmlns:a="http://schemas.openxmlformats.org/drawingml/2006/main" xmlns:r="http://schemas.openxmlformats.org/officeDocument/2006/relationships" xmlns:p="http://schemas.openxmlformats.org/presentationml/2006/main">
+  <p:cSld>
+    <p:bg>
+      <p:bgPr>
+        <a:solidFill>
+          <a:schemeClr val="bg1"/>
+        </a:solidFill>
+        <a:effectLst/>
+      </p:bgPr>
+    </p:bg>
+    <p:spTree>
+      <p:nvGrpSpPr>
+        <p:cNvPr id="1" name=""/>
+        <p:cNvGrpSpPr/>
+        <p:nvPr/>
+      </p:nvGrpSpPr>
+      <p:grpSpPr>
+        <a:xfrm>
+          <a:off x="0" y="0"/>
+          <a:ext cx="0" cy="0"/>
+          <a:chOff x="0" y="0"/>
+          <a:chExt cx="0" cy="0"/>
+        </a:xfrm>
+      </p:grpSpPr>
+      <p:pic>
+        <p:nvPicPr>
+          <p:cNvPr id="6" name="Picture 5"/>
+          <p:cNvPicPr>
+            <a:picLocks noChangeAspect="1"/>
+          </p:cNvPicPr>
+          <p:nvPr/>
+        </p:nvPicPr>
+        <p:blipFill>
+          <a:blip r:embed="rId2"/>
+          <a:stretch>
+            <a:fillRect/>
+          </a:stretch>
+        </p:blipFill>
+        <p:spPr>
+          <a:xfrm>
+            <a:off x="179512" y="332656"/>
+            <a:ext cx="8648306" cy="6203405"/>
+          </a:xfrm>
+          <a:prstGeom prst="rect">
+            <a:avLst/>
+          </a:prstGeom>
+        </p:spPr>
+      </p:pic>
+    </p:spTree>
+    <p:extLst>
+      <p:ext uri="{BB962C8B-B14F-4D97-AF65-F5344CB8AC3E}">
+        <p14:creationId xmlns:p14="http://schemas.microsoft.com/office/powerpoint/2010/main" val="2388382412"/>
       </p:ext>
     </p:extLst>
   </p:cSld>

</xml_diff>

<commit_message>
Tweak presentation and script
</commit_message>
<xml_diff>
--- a/presentation/ControllingTheWorldBouvetOne.pptx
+++ b/presentation/ControllingTheWorldBouvetOne.pptx
@@ -5,7 +5,7 @@
     <p:sldMasterId id="2147483648" r:id="rId1"/>
   </p:sldMasterIdLst>
   <p:notesMasterIdLst>
-    <p:notesMasterId r:id="rId16"/>
+    <p:notesMasterId r:id="rId15"/>
   </p:notesMasterIdLst>
   <p:sldIdLst>
     <p:sldId id="281" r:id="rId2"/>
@@ -14,14 +14,13 @@
     <p:sldId id="293" r:id="rId5"/>
     <p:sldId id="286" r:id="rId6"/>
     <p:sldId id="287" r:id="rId7"/>
-    <p:sldId id="288" r:id="rId8"/>
-    <p:sldId id="289" r:id="rId9"/>
-    <p:sldId id="291" r:id="rId10"/>
-    <p:sldId id="292" r:id="rId11"/>
-    <p:sldId id="294" r:id="rId12"/>
-    <p:sldId id="295" r:id="rId13"/>
-    <p:sldId id="296" r:id="rId14"/>
-    <p:sldId id="278" r:id="rId15"/>
+    <p:sldId id="289" r:id="rId8"/>
+    <p:sldId id="291" r:id="rId9"/>
+    <p:sldId id="292" r:id="rId10"/>
+    <p:sldId id="294" r:id="rId11"/>
+    <p:sldId id="295" r:id="rId12"/>
+    <p:sldId id="296" r:id="rId13"/>
+    <p:sldId id="278" r:id="rId14"/>
   </p:sldIdLst>
   <p:sldSz cx="9144000" cy="6858000" type="screen4x3"/>
   <p:notesSz cx="6797675" cy="9926638"/>
@@ -221,7 +220,7 @@
           <a:p>
             <a:fld id="{722E25F1-470E-45F2-BDE8-F9770272E8C0}" type="datetimeFigureOut">
               <a:rPr lang="nb-NO" smtClean="0"/>
-              <a:t>16.03.2014</a:t>
+              <a:t>18.03.2014</a:t>
             </a:fld>
             <a:endParaRPr lang="nb-NO"/>
           </a:p>
@@ -833,7 +832,7 @@
           <a:p>
             <a:fld id="{73FBBA7B-2A3A-4FBD-B86D-72CEFE9BC3F8}" type="slidenum">
               <a:rPr lang="nb-NO" smtClean="0"/>
-              <a:t>14</a:t>
+              <a:t>13</a:t>
             </a:fld>
             <a:endParaRPr lang="nb-NO"/>
           </a:p>
@@ -1034,7 +1033,7 @@
             <a:fld id="{D6F9BB88-8EBF-42C0-9F76-F5338070E415}" type="datetimeFigureOut">
               <a:rPr lang="nb-NO" smtClean="0"/>
               <a:pPr/>
-              <a:t>16.03.2014</a:t>
+              <a:t>18.03.2014</a:t>
             </a:fld>
             <a:endParaRPr lang="nb-NO"/>
           </a:p>
@@ -1201,7 +1200,7 @@
             <a:fld id="{D6F9BB88-8EBF-42C0-9F76-F5338070E415}" type="datetimeFigureOut">
               <a:rPr lang="nb-NO" smtClean="0"/>
               <a:pPr/>
-              <a:t>16.03.2014</a:t>
+              <a:t>18.03.2014</a:t>
             </a:fld>
             <a:endParaRPr lang="nb-NO"/>
           </a:p>
@@ -1378,7 +1377,7 @@
             <a:fld id="{D6F9BB88-8EBF-42C0-9F76-F5338070E415}" type="datetimeFigureOut">
               <a:rPr lang="nb-NO" smtClean="0"/>
               <a:pPr/>
-              <a:t>16.03.2014</a:t>
+              <a:t>18.03.2014</a:t>
             </a:fld>
             <a:endParaRPr lang="nb-NO"/>
           </a:p>
@@ -1545,7 +1544,7 @@
             <a:fld id="{D6F9BB88-8EBF-42C0-9F76-F5338070E415}" type="datetimeFigureOut">
               <a:rPr lang="nb-NO" smtClean="0"/>
               <a:pPr/>
-              <a:t>16.03.2014</a:t>
+              <a:t>18.03.2014</a:t>
             </a:fld>
             <a:endParaRPr lang="nb-NO"/>
           </a:p>
@@ -1788,7 +1787,7 @@
             <a:fld id="{D6F9BB88-8EBF-42C0-9F76-F5338070E415}" type="datetimeFigureOut">
               <a:rPr lang="nb-NO" smtClean="0"/>
               <a:pPr/>
-              <a:t>16.03.2014</a:t>
+              <a:t>18.03.2014</a:t>
             </a:fld>
             <a:endParaRPr lang="nb-NO"/>
           </a:p>
@@ -2073,7 +2072,7 @@
             <a:fld id="{D6F9BB88-8EBF-42C0-9F76-F5338070E415}" type="datetimeFigureOut">
               <a:rPr lang="nb-NO" smtClean="0"/>
               <a:pPr/>
-              <a:t>16.03.2014</a:t>
+              <a:t>18.03.2014</a:t>
             </a:fld>
             <a:endParaRPr lang="nb-NO"/>
           </a:p>
@@ -2492,7 +2491,7 @@
             <a:fld id="{D6F9BB88-8EBF-42C0-9F76-F5338070E415}" type="datetimeFigureOut">
               <a:rPr lang="nb-NO" smtClean="0"/>
               <a:pPr/>
-              <a:t>16.03.2014</a:t>
+              <a:t>18.03.2014</a:t>
             </a:fld>
             <a:endParaRPr lang="nb-NO"/>
           </a:p>
@@ -2607,7 +2606,7 @@
             <a:fld id="{D6F9BB88-8EBF-42C0-9F76-F5338070E415}" type="datetimeFigureOut">
               <a:rPr lang="nb-NO" smtClean="0"/>
               <a:pPr/>
-              <a:t>16.03.2014</a:t>
+              <a:t>18.03.2014</a:t>
             </a:fld>
             <a:endParaRPr lang="nb-NO"/>
           </a:p>
@@ -2699,7 +2698,7 @@
             <a:fld id="{D6F9BB88-8EBF-42C0-9F76-F5338070E415}" type="datetimeFigureOut">
               <a:rPr lang="nb-NO" smtClean="0"/>
               <a:pPr/>
-              <a:t>16.03.2014</a:t>
+              <a:t>18.03.2014</a:t>
             </a:fld>
             <a:endParaRPr lang="nb-NO"/>
           </a:p>
@@ -2973,7 +2972,7 @@
             <a:fld id="{D6F9BB88-8EBF-42C0-9F76-F5338070E415}" type="datetimeFigureOut">
               <a:rPr lang="nb-NO" smtClean="0"/>
               <a:pPr/>
-              <a:t>16.03.2014</a:t>
+              <a:t>18.03.2014</a:t>
             </a:fld>
             <a:endParaRPr lang="nb-NO"/>
           </a:p>
@@ -3223,7 +3222,7 @@
             <a:fld id="{D6F9BB88-8EBF-42C0-9F76-F5338070E415}" type="datetimeFigureOut">
               <a:rPr lang="nb-NO" smtClean="0"/>
               <a:pPr/>
-              <a:t>16.03.2014</a:t>
+              <a:t>18.03.2014</a:t>
             </a:fld>
             <a:endParaRPr lang="nb-NO"/>
           </a:p>
@@ -3439,7 +3438,7 @@
             <a:fld id="{D6F9BB88-8EBF-42C0-9F76-F5338070E415}" type="datetimeFigureOut">
               <a:rPr lang="nb-NO" smtClean="0"/>
               <a:pPr/>
-              <a:t>16.03.2014</a:t>
+              <a:t>18.03.2014</a:t>
             </a:fld>
             <a:endParaRPr lang="nb-NO"/>
           </a:p>
@@ -4043,98 +4042,6 @@
   <p:cSld>
     <p:bg>
       <p:bgPr>
-        <a:solidFill>
-          <a:schemeClr val="tx1"/>
-        </a:solidFill>
-        <a:effectLst/>
-      </p:bgPr>
-    </p:bg>
-    <p:spTree>
-      <p:nvGrpSpPr>
-        <p:cNvPr id="1" name=""/>
-        <p:cNvGrpSpPr/>
-        <p:nvPr/>
-      </p:nvGrpSpPr>
-      <p:grpSpPr>
-        <a:xfrm>
-          <a:off x="0" y="0"/>
-          <a:ext cx="0" cy="0"/>
-          <a:chOff x="0" y="0"/>
-          <a:chExt cx="0" cy="0"/>
-        </a:xfrm>
-      </p:grpSpPr>
-      <p:sp>
-        <p:nvSpPr>
-          <p:cNvPr id="2" name="Title 1"/>
-          <p:cNvSpPr>
-            <a:spLocks noGrp="1"/>
-          </p:cNvSpPr>
-          <p:nvPr>
-            <p:ph type="title"/>
-          </p:nvPr>
-        </p:nvSpPr>
-        <p:spPr/>
-        <p:txBody>
-          <a:bodyPr>
-            <a:normAutofit/>
-          </a:bodyPr>
-          <a:lstStyle/>
-          <a:p>
-            <a:r>
-              <a:rPr lang="nb-NO" sz="6000" dirty="0">
-                <a:solidFill>
-                  <a:srgbClr val="33EA14"/>
-                </a:solidFill>
-                <a:latin typeface="Consolas" panose="020B0609020204030204" pitchFamily="49" charset="0"/>
-                <a:cs typeface="Consolas" panose="020B0609020204030204" pitchFamily="49" charset="0"/>
-              </a:rPr>
-              <a:t>d</a:t>
-            </a:r>
-            <a:r>
-              <a:rPr lang="nb-NO" sz="6000" dirty="0" smtClean="0">
-                <a:solidFill>
-                  <a:srgbClr val="33EA14"/>
-                </a:solidFill>
-                <a:latin typeface="Consolas" panose="020B0609020204030204" pitchFamily="49" charset="0"/>
-                <a:cs typeface="Consolas" panose="020B0609020204030204" pitchFamily="49" charset="0"/>
-              </a:rPr>
-              <a:t>emo_</a:t>
-            </a:r>
-            <a:endParaRPr lang="nb-NO" sz="6000" dirty="0">
-              <a:solidFill>
-                <a:srgbClr val="33EA14"/>
-              </a:solidFill>
-              <a:latin typeface="Consolas" panose="020B0609020204030204" pitchFamily="49" charset="0"/>
-              <a:cs typeface="Consolas" panose="020B0609020204030204" pitchFamily="49" charset="0"/>
-            </a:endParaRPr>
-          </a:p>
-        </p:txBody>
-      </p:sp>
-    </p:spTree>
-    <p:extLst>
-      <p:ext uri="{BB962C8B-B14F-4D97-AF65-F5344CB8AC3E}">
-        <p14:creationId xmlns:p14="http://schemas.microsoft.com/office/powerpoint/2010/main" val="3018641750"/>
-      </p:ext>
-    </p:extLst>
-  </p:cSld>
-  <p:clrMapOvr>
-    <a:masterClrMapping/>
-  </p:clrMapOvr>
-  <p:timing>
-    <p:tnLst>
-      <p:par>
-        <p:cTn id="1" dur="indefinite" restart="never" nodeType="tmRoot"/>
-      </p:par>
-    </p:tnLst>
-  </p:timing>
-</p:sld>
-</file>
-
-<file path=ppt/slides/slide11.xml><?xml version="1.0" encoding="utf-8"?>
-<p:sld xmlns:a="http://schemas.openxmlformats.org/drawingml/2006/main" xmlns:r="http://schemas.openxmlformats.org/officeDocument/2006/relationships" xmlns:p="http://schemas.openxmlformats.org/presentationml/2006/main">
-  <p:cSld>
-    <p:bg>
-      <p:bgPr>
         <a:blipFill dpi="0" rotWithShape="1">
           <a:blip r:embed="rId2">
             <a:lum/>
@@ -4181,7 +4088,7 @@
 </p:sld>
 </file>
 
-<file path=ppt/slides/slide12.xml><?xml version="1.0" encoding="utf-8"?>
+<file path=ppt/slides/slide11.xml><?xml version="1.0" encoding="utf-8"?>
 <p:sld xmlns:a="http://schemas.openxmlformats.org/drawingml/2006/main" xmlns:r="http://schemas.openxmlformats.org/officeDocument/2006/relationships" xmlns:p="http://schemas.openxmlformats.org/presentationml/2006/main">
   <p:cSld>
     <p:bg>
@@ -4456,7 +4363,7 @@
 </p:sld>
 </file>
 
-<file path=ppt/slides/slide13.xml><?xml version="1.0" encoding="utf-8"?>
+<file path=ppt/slides/slide12.xml><?xml version="1.0" encoding="utf-8"?>
 <p:sld xmlns:a="http://schemas.openxmlformats.org/drawingml/2006/main" xmlns:r="http://schemas.openxmlformats.org/officeDocument/2006/relationships" xmlns:p="http://schemas.openxmlformats.org/presentationml/2006/main">
   <p:cSld>
     <p:bg>
@@ -4529,10 +4436,17 @@
   <p:clrMapOvr>
     <a:masterClrMapping/>
   </p:clrMapOvr>
+  <p:timing>
+    <p:tnLst>
+      <p:par>
+        <p:cTn id="1" dur="indefinite" restart="never" nodeType="tmRoot"/>
+      </p:par>
+    </p:tnLst>
+  </p:timing>
 </p:sld>
 </file>
 
-<file path=ppt/slides/slide14.xml><?xml version="1.0" encoding="utf-8"?>
+<file path=ppt/slides/slide13.xml><?xml version="1.0" encoding="utf-8"?>
 <p:sld xmlns:a="http://schemas.openxmlformats.org/drawingml/2006/main" xmlns:r="http://schemas.openxmlformats.org/officeDocument/2006/relationships" xmlns:p="http://schemas.openxmlformats.org/presentationml/2006/main">
   <p:cSld>
     <p:bg>
@@ -6121,7 +6035,19 @@
                 <a:latin typeface="Courier New" panose="02070309020205020404" pitchFamily="49" charset="0"/>
                 <a:cs typeface="Courier New" panose="02070309020205020404" pitchFamily="49" charset="0"/>
               </a:rPr>
-              <a:t>Hva er </a:t>
+              <a:t>Hva </a:t>
+            </a:r>
+            <a:r>
+              <a:rPr lang="nb-NO" sz="3600" dirty="0" smtClean="0">
+                <a:solidFill>
+                  <a:schemeClr val="bg1">
+                    <a:lumMod val="95000"/>
+                  </a:schemeClr>
+                </a:solidFill>
+                <a:latin typeface="Courier New" panose="02070309020205020404" pitchFamily="49" charset="0"/>
+                <a:cs typeface="Courier New" panose="02070309020205020404" pitchFamily="49" charset="0"/>
+              </a:rPr>
+              <a:t>er </a:t>
             </a:r>
             <a:r>
               <a:rPr lang="nb-NO" sz="3600" dirty="0" err="1" smtClean="0">
@@ -6220,7 +6146,19 @@
                 <a:latin typeface="Courier New" panose="02070309020205020404" pitchFamily="49" charset="0"/>
                 <a:cs typeface="Courier New" panose="02070309020205020404" pitchFamily="49" charset="0"/>
               </a:rPr>
-              <a:t>i gang?</a:t>
+              <a:t>i </a:t>
+            </a:r>
+            <a:r>
+              <a:rPr lang="nb-NO" sz="3600" dirty="0" smtClean="0">
+                <a:solidFill>
+                  <a:schemeClr val="bg1">
+                    <a:lumMod val="95000"/>
+                  </a:schemeClr>
+                </a:solidFill>
+                <a:latin typeface="Courier New" panose="02070309020205020404" pitchFamily="49" charset="0"/>
+                <a:cs typeface="Courier New" panose="02070309020205020404" pitchFamily="49" charset="0"/>
+              </a:rPr>
+              <a:t>gang?</a:t>
             </a:r>
           </a:p>
           <a:p>
@@ -6238,7 +6176,19 @@
                 <a:latin typeface="Courier New" panose="02070309020205020404" pitchFamily="49" charset="0"/>
                 <a:cs typeface="Courier New" panose="02070309020205020404" pitchFamily="49" charset="0"/>
               </a:rPr>
-              <a:t>Mitt prosjekt</a:t>
+              <a:t>Mitt </a:t>
+            </a:r>
+            <a:r>
+              <a:rPr lang="nb-NO" sz="3600" dirty="0" smtClean="0">
+                <a:solidFill>
+                  <a:schemeClr val="bg1">
+                    <a:lumMod val="95000"/>
+                  </a:schemeClr>
+                </a:solidFill>
+                <a:latin typeface="Courier New" panose="02070309020205020404" pitchFamily="49" charset="0"/>
+                <a:cs typeface="Courier New" panose="02070309020205020404" pitchFamily="49" charset="0"/>
+              </a:rPr>
+              <a:t>prosjekt</a:t>
             </a:r>
             <a:endParaRPr lang="nb-NO" sz="3600" dirty="0">
               <a:solidFill>
@@ -6535,110 +6485,6 @@
       </p:grpSpPr>
       <p:pic>
         <p:nvPicPr>
-          <p:cNvPr id="7" name="Content Placeholder 6"/>
-          <p:cNvPicPr>
-            <a:picLocks noGrp="1" noChangeAspect="1"/>
-          </p:cNvPicPr>
-          <p:nvPr>
-            <p:ph idx="1"/>
-          </p:nvPr>
-        </p:nvPicPr>
-        <p:blipFill>
-          <a:blip r:embed="rId2">
-            <a:extLst>
-              <a:ext uri="{28A0092B-C50C-407E-A947-70E740481C1C}">
-                <a14:useLocalDpi xmlns:a14="http://schemas.microsoft.com/office/drawing/2010/main" val="0"/>
-              </a:ext>
-            </a:extLst>
-          </a:blip>
-          <a:stretch>
-            <a:fillRect/>
-          </a:stretch>
-        </p:blipFill>
-        <p:spPr>
-          <a:xfrm>
-            <a:off x="323528" y="1217542"/>
-            <a:ext cx="3680705" cy="4608512"/>
-          </a:xfrm>
-        </p:spPr>
-      </p:pic>
-      <p:pic>
-        <p:nvPicPr>
-          <p:cNvPr id="8" name="Picture 7"/>
-          <p:cNvPicPr>
-            <a:picLocks noChangeAspect="1"/>
-          </p:cNvPicPr>
-          <p:nvPr/>
-        </p:nvPicPr>
-        <p:blipFill>
-          <a:blip r:embed="rId3">
-            <a:extLst>
-              <a:ext uri="{28A0092B-C50C-407E-A947-70E740481C1C}">
-                <a14:useLocalDpi xmlns:a14="http://schemas.microsoft.com/office/drawing/2010/main" val="0"/>
-              </a:ext>
-            </a:extLst>
-          </a:blip>
-          <a:stretch>
-            <a:fillRect/>
-          </a:stretch>
-        </p:blipFill>
-        <p:spPr>
-          <a:xfrm>
-            <a:off x="4211960" y="1196752"/>
-            <a:ext cx="4608512" cy="4629302"/>
-          </a:xfrm>
-          <a:prstGeom prst="rect">
-            <a:avLst/>
-          </a:prstGeom>
-        </p:spPr>
-      </p:pic>
-    </p:spTree>
-    <p:extLst>
-      <p:ext uri="{BB962C8B-B14F-4D97-AF65-F5344CB8AC3E}">
-        <p14:creationId xmlns:p14="http://schemas.microsoft.com/office/powerpoint/2010/main" val="1536702834"/>
-      </p:ext>
-    </p:extLst>
-  </p:cSld>
-  <p:clrMapOvr>
-    <a:masterClrMapping/>
-  </p:clrMapOvr>
-  <p:timing>
-    <p:tnLst>
-      <p:par>
-        <p:cTn id="1" dur="indefinite" restart="never" nodeType="tmRoot"/>
-      </p:par>
-    </p:tnLst>
-  </p:timing>
-</p:sld>
-</file>
-
-<file path=ppt/slides/slide8.xml><?xml version="1.0" encoding="utf-8"?>
-<p:sld xmlns:a="http://schemas.openxmlformats.org/drawingml/2006/main" xmlns:r="http://schemas.openxmlformats.org/officeDocument/2006/relationships" xmlns:p="http://schemas.openxmlformats.org/presentationml/2006/main">
-  <p:cSld>
-    <p:bg>
-      <p:bgPr>
-        <a:solidFill>
-          <a:schemeClr val="tx1"/>
-        </a:solidFill>
-        <a:effectLst/>
-      </p:bgPr>
-    </p:bg>
-    <p:spTree>
-      <p:nvGrpSpPr>
-        <p:cNvPr id="1" name=""/>
-        <p:cNvGrpSpPr/>
-        <p:nvPr/>
-      </p:nvGrpSpPr>
-      <p:grpSpPr>
-        <a:xfrm>
-          <a:off x="0" y="0"/>
-          <a:ext cx="0" cy="0"/>
-          <a:chOff x="0" y="0"/>
-          <a:chExt cx="0" cy="0"/>
-        </a:xfrm>
-      </p:grpSpPr>
-      <p:pic>
-        <p:nvPicPr>
           <p:cNvPr id="4" name="Content Placeholder 3"/>
           <p:cNvPicPr>
             <a:picLocks noGrp="1" noChangeAspect="1"/>
@@ -6724,7 +6570,7 @@
 </p:sld>
 </file>
 
-<file path=ppt/slides/slide9.xml><?xml version="1.0" encoding="utf-8"?>
+<file path=ppt/slides/slide8.xml><?xml version="1.0" encoding="utf-8"?>
 <p:sld xmlns:a="http://schemas.openxmlformats.org/drawingml/2006/main" xmlns:r="http://schemas.openxmlformats.org/officeDocument/2006/relationships" xmlns:p="http://schemas.openxmlformats.org/presentationml/2006/main">
   <p:cSld>
     <p:bg>
@@ -6777,6 +6623,98 @@
     <p:extLst>
       <p:ext uri="{BB962C8B-B14F-4D97-AF65-F5344CB8AC3E}">
         <p14:creationId xmlns:p14="http://schemas.microsoft.com/office/powerpoint/2010/main" val="2388382412"/>
+      </p:ext>
+    </p:extLst>
+  </p:cSld>
+  <p:clrMapOvr>
+    <a:masterClrMapping/>
+  </p:clrMapOvr>
+  <p:timing>
+    <p:tnLst>
+      <p:par>
+        <p:cTn id="1" dur="indefinite" restart="never" nodeType="tmRoot"/>
+      </p:par>
+    </p:tnLst>
+  </p:timing>
+</p:sld>
+</file>
+
+<file path=ppt/slides/slide9.xml><?xml version="1.0" encoding="utf-8"?>
+<p:sld xmlns:a="http://schemas.openxmlformats.org/drawingml/2006/main" xmlns:r="http://schemas.openxmlformats.org/officeDocument/2006/relationships" xmlns:p="http://schemas.openxmlformats.org/presentationml/2006/main">
+  <p:cSld>
+    <p:bg>
+      <p:bgPr>
+        <a:solidFill>
+          <a:schemeClr val="tx1"/>
+        </a:solidFill>
+        <a:effectLst/>
+      </p:bgPr>
+    </p:bg>
+    <p:spTree>
+      <p:nvGrpSpPr>
+        <p:cNvPr id="1" name=""/>
+        <p:cNvGrpSpPr/>
+        <p:nvPr/>
+      </p:nvGrpSpPr>
+      <p:grpSpPr>
+        <a:xfrm>
+          <a:off x="0" y="0"/>
+          <a:ext cx="0" cy="0"/>
+          <a:chOff x="0" y="0"/>
+          <a:chExt cx="0" cy="0"/>
+        </a:xfrm>
+      </p:grpSpPr>
+      <p:sp>
+        <p:nvSpPr>
+          <p:cNvPr id="2" name="Title 1"/>
+          <p:cNvSpPr>
+            <a:spLocks noGrp="1"/>
+          </p:cNvSpPr>
+          <p:nvPr>
+            <p:ph type="title"/>
+          </p:nvPr>
+        </p:nvSpPr>
+        <p:spPr/>
+        <p:txBody>
+          <a:bodyPr>
+            <a:normAutofit/>
+          </a:bodyPr>
+          <a:lstStyle/>
+          <a:p>
+            <a:r>
+              <a:rPr lang="nb-NO" sz="6000" dirty="0">
+                <a:solidFill>
+                  <a:srgbClr val="33EA14"/>
+                </a:solidFill>
+                <a:latin typeface="Consolas" panose="020B0609020204030204" pitchFamily="49" charset="0"/>
+                <a:cs typeface="Consolas" panose="020B0609020204030204" pitchFamily="49" charset="0"/>
+              </a:rPr>
+              <a:t>d</a:t>
+            </a:r>
+            <a:r>
+              <a:rPr lang="nb-NO" sz="6000" dirty="0" smtClean="0">
+                <a:solidFill>
+                  <a:srgbClr val="33EA14"/>
+                </a:solidFill>
+                <a:latin typeface="Consolas" panose="020B0609020204030204" pitchFamily="49" charset="0"/>
+                <a:cs typeface="Consolas" panose="020B0609020204030204" pitchFamily="49" charset="0"/>
+              </a:rPr>
+              <a:t>emo_</a:t>
+            </a:r>
+            <a:endParaRPr lang="nb-NO" sz="6000" dirty="0">
+              <a:solidFill>
+                <a:srgbClr val="33EA14"/>
+              </a:solidFill>
+              <a:latin typeface="Consolas" panose="020B0609020204030204" pitchFamily="49" charset="0"/>
+              <a:cs typeface="Consolas" panose="020B0609020204030204" pitchFamily="49" charset="0"/>
+            </a:endParaRPr>
+          </a:p>
+        </p:txBody>
+      </p:sp>
+    </p:spTree>
+    <p:extLst>
+      <p:ext uri="{BB962C8B-B14F-4D97-AF65-F5344CB8AC3E}">
+        <p14:creationId xmlns:p14="http://schemas.microsoft.com/office/powerpoint/2010/main" val="3018641750"/>
       </p:ext>
     </p:extLst>
   </p:cSld>

</xml_diff>